<commit_message>
and still more cleanup
</commit_message>
<xml_diff>
--- a/ppt/2. Query Plans/Query Plan Usage - KCDC 2018.pptx
+++ b/ppt/2. Query Plans/Query Plan Usage - KCDC 2018.pptx
@@ -5,10 +5,10 @@
     <p:sldMasterId id="2147483987" r:id="rId1"/>
   </p:sldMasterIdLst>
   <p:notesMasterIdLst>
-    <p:notesMasterId r:id="rId20"/>
+    <p:notesMasterId r:id="rId21"/>
   </p:notesMasterIdLst>
   <p:handoutMasterIdLst>
-    <p:handoutMasterId r:id="rId21"/>
+    <p:handoutMasterId r:id="rId22"/>
   </p:handoutMasterIdLst>
   <p:sldIdLst>
     <p:sldId id="265" r:id="rId2"/>
@@ -29,6 +29,7 @@
     <p:sldId id="305" r:id="rId17"/>
     <p:sldId id="296" r:id="rId18"/>
     <p:sldId id="301" r:id="rId19"/>
+    <p:sldId id="313" r:id="rId20"/>
   </p:sldIdLst>
   <p:sldSz cx="9144000" cy="6858000" type="screen4x3"/>
   <p:notesSz cx="7010400" cy="9296400"/>
@@ -11109,40 +11110,6 @@
           </a:p>
         </p:txBody>
       </p:sp>
-      <p:sp>
-        <p:nvSpPr>
-          <p:cNvPr id="2" name="TextBox 1"/>
-          <p:cNvSpPr txBox="1"/>
-          <p:nvPr/>
-        </p:nvSpPr>
-        <p:spPr>
-          <a:xfrm>
-            <a:off x="1907766" y="5349349"/>
-            <a:ext cx="5296520" cy="400110"/>
-          </a:xfrm>
-          <a:prstGeom prst="rect">
-            <a:avLst/>
-          </a:prstGeom>
-          <a:noFill/>
-        </p:spPr>
-        <p:txBody>
-          <a:bodyPr wrap="square" rtlCol="0">
-            <a:spAutoFit/>
-          </a:bodyPr>
-          <a:lstStyle/>
-          <a:p>
-            <a:pPr algn="ctr"/>
-            <a:r>
-              <a:rPr lang="en-US" sz="2000" b="1" dirty="0">
-                <a:solidFill>
-                  <a:srgbClr val="03557B"/>
-                </a:solidFill>
-              </a:rPr>
-              <a:t>Download samples at www.scalesql.com</a:t>
-            </a:r>
-          </a:p>
-        </p:txBody>
-      </p:sp>
     </p:spTree>
   </p:cSld>
   <p:clrMapOvr>
@@ -13623,6 +13590,118 @@
       </p:transition>
     </mc:Fallback>
   </mc:AlternateContent>
+</p:sld>
+</file>
+
+<file path=ppt/slides/slide19.xml><?xml version="1.0" encoding="utf-8"?>
+<p:sld xmlns:a="http://schemas.openxmlformats.org/drawingml/2006/main" xmlns:r="http://schemas.openxmlformats.org/officeDocument/2006/relationships" xmlns:p="http://schemas.openxmlformats.org/presentationml/2006/main">
+  <p:cSld>
+    <p:spTree>
+      <p:nvGrpSpPr>
+        <p:cNvPr id="1" name=""/>
+        <p:cNvGrpSpPr/>
+        <p:nvPr/>
+      </p:nvGrpSpPr>
+      <p:grpSpPr>
+        <a:xfrm>
+          <a:off x="0" y="0"/>
+          <a:ext cx="0" cy="0"/>
+          <a:chOff x="0" y="0"/>
+          <a:chExt cx="0" cy="0"/>
+        </a:xfrm>
+      </p:grpSpPr>
+      <p:sp>
+        <p:nvSpPr>
+          <p:cNvPr id="7" name="Title 6">
+            <a:extLst>
+              <a:ext uri="{FF2B5EF4-FFF2-40B4-BE49-F238E27FC236}">
+                <a16:creationId xmlns:a16="http://schemas.microsoft.com/office/drawing/2014/main" id="{E3ECFACD-8E70-4A6F-8E9B-D6E94B3A5E17}"/>
+              </a:ext>
+            </a:extLst>
+          </p:cNvPr>
+          <p:cNvSpPr>
+            <a:spLocks noGrp="1"/>
+          </p:cNvSpPr>
+          <p:nvPr>
+            <p:ph type="title"/>
+          </p:nvPr>
+        </p:nvSpPr>
+        <p:spPr/>
+        <p:txBody>
+          <a:bodyPr/>
+          <a:lstStyle/>
+          <a:p>
+            <a:r>
+              <a:rPr lang="en-US" dirty="0"/>
+              <a:t>Questions?</a:t>
+            </a:r>
+          </a:p>
+        </p:txBody>
+      </p:sp>
+      <p:sp>
+        <p:nvSpPr>
+          <p:cNvPr id="8" name="Text Placeholder 7">
+            <a:extLst>
+              <a:ext uri="{FF2B5EF4-FFF2-40B4-BE49-F238E27FC236}">
+                <a16:creationId xmlns:a16="http://schemas.microsoft.com/office/drawing/2014/main" id="{F1DCE74B-B43D-46FD-9FAE-6BDA381CD394}"/>
+              </a:ext>
+            </a:extLst>
+          </p:cNvPr>
+          <p:cNvSpPr>
+            <a:spLocks noGrp="1"/>
+          </p:cNvSpPr>
+          <p:nvPr>
+            <p:ph type="body" idx="1"/>
+          </p:nvPr>
+        </p:nvSpPr>
+        <p:spPr/>
+        <p:txBody>
+          <a:bodyPr/>
+          <a:lstStyle/>
+          <a:p>
+            <a:endParaRPr lang="en-US"/>
+          </a:p>
+        </p:txBody>
+      </p:sp>
+      <p:sp>
+        <p:nvSpPr>
+          <p:cNvPr id="4" name="Footer Placeholder 3">
+            <a:extLst>
+              <a:ext uri="{FF2B5EF4-FFF2-40B4-BE49-F238E27FC236}">
+                <a16:creationId xmlns:a16="http://schemas.microsoft.com/office/drawing/2014/main" id="{EE7C713E-27AE-47D0-AF6A-2AF4F8895576}"/>
+              </a:ext>
+            </a:extLst>
+          </p:cNvPr>
+          <p:cNvSpPr>
+            <a:spLocks noGrp="1"/>
+          </p:cNvSpPr>
+          <p:nvPr>
+            <p:ph type="ftr" sz="quarter" idx="11"/>
+          </p:nvPr>
+        </p:nvSpPr>
+        <p:spPr/>
+        <p:txBody>
+          <a:bodyPr/>
+          <a:lstStyle/>
+          <a:p>
+            <a:r>
+              <a:rPr lang="de-DE"/>
+              <a:t>Understanding the Procedure Cache</a:t>
+            </a:r>
+            <a:endParaRPr lang="de-DE" dirty="0"/>
+          </a:p>
+        </p:txBody>
+      </p:sp>
+    </p:spTree>
+    <p:extLst>
+      <p:ext uri="{BB962C8B-B14F-4D97-AF65-F5344CB8AC3E}">
+        <p14:creationId xmlns:p14="http://schemas.microsoft.com/office/powerpoint/2010/main" val="1217818366"/>
+      </p:ext>
+    </p:extLst>
+  </p:cSld>
+  <p:clrMapOvr>
+    <a:masterClrMapping/>
+  </p:clrMapOvr>
 </p:sld>
 </file>
 

</xml_diff>